<commit_message>
Documentation : update of presentation
</commit_message>
<xml_diff>
--- a/01-Documentation/M1-projet-LOA-presentation-gresh.pptx
+++ b/01-Documentation/M1-projet-LOA-presentation-gresh.pptx
@@ -5,14 +5,16 @@
     <p:sldMasterId id="2147483648" r:id="rId1"/>
   </p:sldMasterIdLst>
   <p:notesMasterIdLst>
-    <p:notesMasterId r:id="rId7"/>
+    <p:notesMasterId r:id="rId9"/>
   </p:notesMasterIdLst>
   <p:sldIdLst>
     <p:sldId id="262" r:id="rId2"/>
     <p:sldId id="268" r:id="rId3"/>
-    <p:sldId id="270" r:id="rId4"/>
-    <p:sldId id="271" r:id="rId5"/>
-    <p:sldId id="272" r:id="rId6"/>
+    <p:sldId id="274" r:id="rId4"/>
+    <p:sldId id="270" r:id="rId5"/>
+    <p:sldId id="271" r:id="rId6"/>
+    <p:sldId id="272" r:id="rId7"/>
+    <p:sldId id="273" r:id="rId8"/>
   </p:sldIdLst>
   <p:sldSz cx="12192000" cy="6858000"/>
   <p:notesSz cx="6858000" cy="9144000"/>
@@ -4323,6 +4325,43 @@
       </p:grpSpPr>
       <p:sp>
         <p:nvSpPr>
+          <p:cNvPr id="2" name="Title 1">
+            <a:extLst>
+              <a:ext uri="{FF2B5EF4-FFF2-40B4-BE49-F238E27FC236}">
+                <a16:creationId xmlns:a16="http://schemas.microsoft.com/office/drawing/2014/main" id="{41E78312-4CD1-43E2-AEA2-E2756A13FEC2}"/>
+              </a:ext>
+            </a:extLst>
+          </p:cNvPr>
+          <p:cNvSpPr>
+            <a:spLocks noGrp="1"/>
+          </p:cNvSpPr>
+          <p:nvPr>
+            <p:ph type="title"/>
+          </p:nvPr>
+        </p:nvSpPr>
+        <p:spPr>
+          <a:xfrm>
+            <a:off x="2296357" y="529734"/>
+            <a:ext cx="7599286" cy="948261"/>
+          </a:xfrm>
+        </p:spPr>
+        <p:txBody>
+          <a:bodyPr>
+            <a:normAutofit/>
+          </a:bodyPr>
+          <a:lstStyle/>
+          <a:p>
+            <a:pPr algn="ctr"/>
+            <a:r>
+              <a:rPr lang="fr-FR" b="1"/>
+              <a:t>Portes</a:t>
+            </a:r>
+            <a:endParaRPr lang="en-US" b="1"/>
+          </a:p>
+        </p:txBody>
+      </p:sp>
+      <p:sp>
+        <p:nvSpPr>
           <p:cNvPr id="33" name="Slide Number Placeholder 32">
             <a:extLst>
               <a:ext uri="{FF2B5EF4-FFF2-40B4-BE49-F238E27FC236}">
@@ -4355,12 +4394,444 @@
           </a:p>
         </p:txBody>
       </p:sp>
+      <p:sp>
+        <p:nvSpPr>
+          <p:cNvPr id="8" name="Rectangle 7">
+            <a:extLst>
+              <a:ext uri="{FF2B5EF4-FFF2-40B4-BE49-F238E27FC236}">
+                <a16:creationId xmlns:a16="http://schemas.microsoft.com/office/drawing/2014/main" id="{38D52181-B2B1-4538-86AF-C6A0D95FEF55}"/>
+              </a:ext>
+            </a:extLst>
+          </p:cNvPr>
+          <p:cNvSpPr/>
+          <p:nvPr/>
+        </p:nvSpPr>
+        <p:spPr>
+          <a:xfrm>
+            <a:off x="5121675" y="2153838"/>
+            <a:ext cx="1948650" cy="594804"/>
+          </a:xfrm>
+          <a:prstGeom prst="rect">
+            <a:avLst/>
+          </a:prstGeom>
+          <a:solidFill>
+            <a:schemeClr val="bg1"/>
+          </a:solidFill>
+          <a:ln>
+            <a:solidFill>
+              <a:schemeClr val="tx1"/>
+            </a:solidFill>
+          </a:ln>
+          <a:effectLst>
+            <a:outerShdw blurRad="50800" dist="38100" dir="5400000" algn="t" rotWithShape="0">
+              <a:prstClr val="black">
+                <a:alpha val="40000"/>
+              </a:prstClr>
+            </a:outerShdw>
+          </a:effectLst>
+        </p:spPr>
+        <p:style>
+          <a:lnRef idx="2">
+            <a:schemeClr val="dk1">
+              <a:shade val="50000"/>
+            </a:schemeClr>
+          </a:lnRef>
+          <a:fillRef idx="1">
+            <a:schemeClr val="dk1"/>
+          </a:fillRef>
+          <a:effectRef idx="0">
+            <a:schemeClr val="dk1"/>
+          </a:effectRef>
+          <a:fontRef idx="minor">
+            <a:schemeClr val="lt1"/>
+          </a:fontRef>
+        </p:style>
+        <p:txBody>
+          <a:bodyPr rtlCol="0" anchor="ctr"/>
+          <a:lstStyle/>
+          <a:p>
+            <a:pPr algn="ctr"/>
+            <a:r>
+              <a:rPr lang="fr-FR" sz="2400">
+                <a:solidFill>
+                  <a:schemeClr val="tx1"/>
+                </a:solidFill>
+              </a:rPr>
+              <a:t>G</a:t>
+            </a:r>
+            <a:r>
+              <a:rPr lang="en-US" sz="2400">
+                <a:solidFill>
+                  <a:schemeClr val="tx1"/>
+                </a:solidFill>
+              </a:rPr>
+              <a:t>ate</a:t>
+            </a:r>
+            <a:endParaRPr lang="fr-FR" sz="2400">
+              <a:solidFill>
+                <a:schemeClr val="tx1"/>
+              </a:solidFill>
+            </a:endParaRPr>
+          </a:p>
+        </p:txBody>
+      </p:sp>
+      <p:sp>
+        <p:nvSpPr>
+          <p:cNvPr id="9" name="Rectangle 8">
+            <a:extLst>
+              <a:ext uri="{FF2B5EF4-FFF2-40B4-BE49-F238E27FC236}">
+                <a16:creationId xmlns:a16="http://schemas.microsoft.com/office/drawing/2014/main" id="{5A1C1214-E1AA-4223-B4E8-4629457E0359}"/>
+              </a:ext>
+            </a:extLst>
+          </p:cNvPr>
+          <p:cNvSpPr/>
+          <p:nvPr/>
+        </p:nvSpPr>
+        <p:spPr>
+          <a:xfrm>
+            <a:off x="3320250" y="3648059"/>
+            <a:ext cx="2068376" cy="594804"/>
+          </a:xfrm>
+          <a:prstGeom prst="rect">
+            <a:avLst/>
+          </a:prstGeom>
+          <a:solidFill>
+            <a:schemeClr val="bg1"/>
+          </a:solidFill>
+          <a:ln>
+            <a:solidFill>
+              <a:schemeClr val="tx1"/>
+            </a:solidFill>
+          </a:ln>
+          <a:effectLst>
+            <a:outerShdw blurRad="50800" dist="38100" dir="5400000" algn="t" rotWithShape="0">
+              <a:prstClr val="black">
+                <a:alpha val="40000"/>
+              </a:prstClr>
+            </a:outerShdw>
+          </a:effectLst>
+        </p:spPr>
+        <p:style>
+          <a:lnRef idx="2">
+            <a:schemeClr val="dk1">
+              <a:shade val="50000"/>
+            </a:schemeClr>
+          </a:lnRef>
+          <a:fillRef idx="1">
+            <a:schemeClr val="dk1"/>
+          </a:fillRef>
+          <a:effectRef idx="0">
+            <a:schemeClr val="dk1"/>
+          </a:effectRef>
+          <a:fontRef idx="minor">
+            <a:schemeClr val="lt1"/>
+          </a:fontRef>
+        </p:style>
+        <p:txBody>
+          <a:bodyPr rtlCol="0" anchor="ctr"/>
+          <a:lstStyle/>
+          <a:p>
+            <a:pPr algn="ctr"/>
+            <a:r>
+              <a:rPr lang="fr-FR" sz="2400">
+                <a:solidFill>
+                  <a:schemeClr val="tx1"/>
+                </a:solidFill>
+              </a:rPr>
+              <a:t>LogicalGate</a:t>
+            </a:r>
+            <a:endParaRPr lang="en-US" sz="2400">
+              <a:solidFill>
+                <a:schemeClr val="tx1"/>
+              </a:solidFill>
+            </a:endParaRPr>
+          </a:p>
+        </p:txBody>
+      </p:sp>
+      <p:sp>
+        <p:nvSpPr>
+          <p:cNvPr id="10" name="Rectangle 9">
+            <a:extLst>
+              <a:ext uri="{FF2B5EF4-FFF2-40B4-BE49-F238E27FC236}">
+                <a16:creationId xmlns:a16="http://schemas.microsoft.com/office/drawing/2014/main" id="{057FA57D-038F-4644-A2C0-D75F20DBB924}"/>
+              </a:ext>
+            </a:extLst>
+          </p:cNvPr>
+          <p:cNvSpPr/>
+          <p:nvPr/>
+        </p:nvSpPr>
+        <p:spPr>
+          <a:xfrm>
+            <a:off x="6757267" y="3655021"/>
+            <a:ext cx="1948650" cy="594804"/>
+          </a:xfrm>
+          <a:prstGeom prst="rect">
+            <a:avLst/>
+          </a:prstGeom>
+          <a:solidFill>
+            <a:schemeClr val="bg1"/>
+          </a:solidFill>
+          <a:ln>
+            <a:solidFill>
+              <a:schemeClr val="tx1"/>
+            </a:solidFill>
+          </a:ln>
+          <a:effectLst>
+            <a:outerShdw blurRad="50800" dist="38100" dir="5400000" algn="t" rotWithShape="0">
+              <a:prstClr val="black">
+                <a:alpha val="40000"/>
+              </a:prstClr>
+            </a:outerShdw>
+          </a:effectLst>
+        </p:spPr>
+        <p:style>
+          <a:lnRef idx="2">
+            <a:schemeClr val="dk1">
+              <a:shade val="50000"/>
+            </a:schemeClr>
+          </a:lnRef>
+          <a:fillRef idx="1">
+            <a:schemeClr val="dk1"/>
+          </a:fillRef>
+          <a:effectRef idx="0">
+            <a:schemeClr val="dk1"/>
+          </a:effectRef>
+          <a:fontRef idx="minor">
+            <a:schemeClr val="lt1"/>
+          </a:fontRef>
+        </p:style>
+        <p:txBody>
+          <a:bodyPr rtlCol="0" anchor="ctr"/>
+          <a:lstStyle/>
+          <a:p>
+            <a:pPr algn="ctr"/>
+            <a:r>
+              <a:rPr lang="fr-FR" sz="2400">
+                <a:solidFill>
+                  <a:schemeClr val="tx1"/>
+                </a:solidFill>
+              </a:rPr>
+              <a:t>IOGate</a:t>
+            </a:r>
+            <a:endParaRPr lang="en-US" sz="2400">
+              <a:solidFill>
+                <a:schemeClr val="tx1"/>
+              </a:solidFill>
+            </a:endParaRPr>
+          </a:p>
+        </p:txBody>
+      </p:sp>
+      <p:cxnSp>
+        <p:nvCxnSpPr>
+          <p:cNvPr id="11" name="Connector: Elbow 10">
+            <a:extLst>
+              <a:ext uri="{FF2B5EF4-FFF2-40B4-BE49-F238E27FC236}">
+                <a16:creationId xmlns:a16="http://schemas.microsoft.com/office/drawing/2014/main" id="{5307C0F9-0DC2-4772-B366-D9ACC8FA5EF8}"/>
+              </a:ext>
+            </a:extLst>
+          </p:cNvPr>
+          <p:cNvCxnSpPr>
+            <a:cxnSpLocks/>
+            <a:stCxn id="8" idx="2"/>
+            <a:endCxn id="9" idx="0"/>
+          </p:cNvCxnSpPr>
+          <p:nvPr/>
+        </p:nvCxnSpPr>
+        <p:spPr>
+          <a:xfrm rot="5400000">
+            <a:off x="4775511" y="2327569"/>
+            <a:ext cx="899417" cy="1741562"/>
+          </a:xfrm>
+          <a:prstGeom prst="bentConnector3">
+            <a:avLst/>
+          </a:prstGeom>
+          <a:ln w="28575">
+            <a:tailEnd type="triangle"/>
+          </a:ln>
+        </p:spPr>
+        <p:style>
+          <a:lnRef idx="1">
+            <a:schemeClr val="accent1"/>
+          </a:lnRef>
+          <a:fillRef idx="0">
+            <a:schemeClr val="accent1"/>
+          </a:fillRef>
+          <a:effectRef idx="0">
+            <a:schemeClr val="accent1"/>
+          </a:effectRef>
+          <a:fontRef idx="minor">
+            <a:schemeClr val="tx1"/>
+          </a:fontRef>
+        </p:style>
+      </p:cxnSp>
+      <p:cxnSp>
+        <p:nvCxnSpPr>
+          <p:cNvPr id="12" name="Connector: Elbow 11">
+            <a:extLst>
+              <a:ext uri="{FF2B5EF4-FFF2-40B4-BE49-F238E27FC236}">
+                <a16:creationId xmlns:a16="http://schemas.microsoft.com/office/drawing/2014/main" id="{4837EA93-1425-43B6-BF37-44A7778E43D3}"/>
+              </a:ext>
+            </a:extLst>
+          </p:cNvPr>
+          <p:cNvCxnSpPr>
+            <a:cxnSpLocks/>
+            <a:stCxn id="8" idx="2"/>
+            <a:endCxn id="10" idx="0"/>
+          </p:cNvCxnSpPr>
+          <p:nvPr/>
+        </p:nvCxnSpPr>
+        <p:spPr>
+          <a:xfrm rot="16200000" flipH="1">
+            <a:off x="6460607" y="2384035"/>
+            <a:ext cx="906379" cy="1635592"/>
+          </a:xfrm>
+          <a:prstGeom prst="bentConnector3">
+            <a:avLst>
+              <a:gd name="adj1" fmla="val 50000"/>
+            </a:avLst>
+          </a:prstGeom>
+          <a:ln w="28575">
+            <a:tailEnd type="triangle"/>
+          </a:ln>
+        </p:spPr>
+        <p:style>
+          <a:lnRef idx="1">
+            <a:schemeClr val="accent1"/>
+          </a:lnRef>
+          <a:fillRef idx="0">
+            <a:schemeClr val="accent1"/>
+          </a:fillRef>
+          <a:effectRef idx="0">
+            <a:schemeClr val="accent1"/>
+          </a:effectRef>
+          <a:fontRef idx="minor">
+            <a:schemeClr val="tx1"/>
+          </a:fontRef>
+        </p:style>
+      </p:cxnSp>
+      <p:sp>
+        <p:nvSpPr>
+          <p:cNvPr id="13" name="TextBox 12">
+            <a:extLst>
+              <a:ext uri="{FF2B5EF4-FFF2-40B4-BE49-F238E27FC236}">
+                <a16:creationId xmlns:a16="http://schemas.microsoft.com/office/drawing/2014/main" id="{EDAE0C12-E830-4F99-BF05-575241965166}"/>
+              </a:ext>
+            </a:extLst>
+          </p:cNvPr>
+          <p:cNvSpPr txBox="1"/>
+          <p:nvPr/>
+        </p:nvSpPr>
+        <p:spPr>
+          <a:xfrm>
+            <a:off x="3914096" y="4518595"/>
+            <a:ext cx="1671386" cy="400110"/>
+          </a:xfrm>
+          <a:prstGeom prst="rect">
+            <a:avLst/>
+          </a:prstGeom>
+          <a:noFill/>
+        </p:spPr>
+        <p:txBody>
+          <a:bodyPr wrap="square" rtlCol="0">
+            <a:spAutoFit/>
+          </a:bodyPr>
+          <a:lstStyle/>
+          <a:p>
+            <a:r>
+              <a:rPr lang="fr-FR" sz="2000"/>
+              <a:t>entrées</a:t>
+            </a:r>
+          </a:p>
+        </p:txBody>
+      </p:sp>
+      <p:sp>
+        <p:nvSpPr>
+          <p:cNvPr id="14" name="TextBox 13">
+            <a:extLst>
+              <a:ext uri="{FF2B5EF4-FFF2-40B4-BE49-F238E27FC236}">
+                <a16:creationId xmlns:a16="http://schemas.microsoft.com/office/drawing/2014/main" id="{E02FF1C6-5432-4768-8312-22C19800289B}"/>
+              </a:ext>
+            </a:extLst>
+          </p:cNvPr>
+          <p:cNvSpPr txBox="1"/>
+          <p:nvPr/>
+        </p:nvSpPr>
+        <p:spPr>
+          <a:xfrm>
+            <a:off x="7409036" y="4504343"/>
+            <a:ext cx="1671385" cy="400110"/>
+          </a:xfrm>
+          <a:prstGeom prst="rect">
+            <a:avLst/>
+          </a:prstGeom>
+          <a:noFill/>
+        </p:spPr>
+        <p:txBody>
+          <a:bodyPr wrap="square" rtlCol="0">
+            <a:spAutoFit/>
+          </a:bodyPr>
+          <a:lstStyle/>
+          <a:p>
+            <a:r>
+              <a:rPr lang="fr-FR" sz="2000"/>
+              <a:t>nom</a:t>
+            </a:r>
+          </a:p>
+        </p:txBody>
+      </p:sp>
+      <p:sp>
+        <p:nvSpPr>
+          <p:cNvPr id="15" name="TextBox 14">
+            <a:extLst>
+              <a:ext uri="{FF2B5EF4-FFF2-40B4-BE49-F238E27FC236}">
+                <a16:creationId xmlns:a16="http://schemas.microsoft.com/office/drawing/2014/main" id="{F3B26BBB-6D21-4299-988F-DFEA3B65A902}"/>
+              </a:ext>
+            </a:extLst>
+          </p:cNvPr>
+          <p:cNvSpPr txBox="1"/>
+          <p:nvPr/>
+        </p:nvSpPr>
+        <p:spPr>
+          <a:xfrm>
+            <a:off x="7240360" y="1931849"/>
+            <a:ext cx="2835795" cy="1015663"/>
+          </a:xfrm>
+          <a:prstGeom prst="rect">
+            <a:avLst/>
+          </a:prstGeom>
+          <a:noFill/>
+        </p:spPr>
+        <p:txBody>
+          <a:bodyPr wrap="square" rtlCol="0">
+            <a:spAutoFit/>
+          </a:bodyPr>
+          <a:lstStyle/>
+          <a:p>
+            <a:r>
+              <a:rPr lang="fr-FR" sz="2000"/>
+              <a:t>Valeur</a:t>
+            </a:r>
+          </a:p>
+          <a:p>
+            <a:r>
+              <a:rPr lang="fr-FR" sz="2000"/>
+              <a:t>Expression logique</a:t>
+            </a:r>
+          </a:p>
+          <a:p>
+            <a:r>
+              <a:rPr lang="fr-FR" sz="2000"/>
+              <a:t>Coordonnées</a:t>
+            </a:r>
+          </a:p>
+        </p:txBody>
+      </p:sp>
       <p:pic>
         <p:nvPicPr>
-          <p:cNvPr id="11" name="Picture 10">
-            <a:extLst>
-              <a:ext uri="{FF2B5EF4-FFF2-40B4-BE49-F238E27FC236}">
-                <a16:creationId xmlns:a16="http://schemas.microsoft.com/office/drawing/2014/main" id="{76AAEB43-BC63-44C6-8F05-7B23BB7647B5}"/>
+          <p:cNvPr id="18" name="Picture 17">
+            <a:extLst>
+              <a:ext uri="{FF2B5EF4-FFF2-40B4-BE49-F238E27FC236}">
+                <a16:creationId xmlns:a16="http://schemas.microsoft.com/office/drawing/2014/main" id="{832E1DE9-094F-455E-AAA8-0FC76ED11DFC}"/>
               </a:ext>
             </a:extLst>
           </p:cNvPr>
@@ -4377,55 +4848,18 @@
         </p:blipFill>
         <p:spPr>
           <a:xfrm>
-            <a:off x="0" y="0"/>
-            <a:ext cx="9212783" cy="6858000"/>
+            <a:off x="3178207" y="5609109"/>
+            <a:ext cx="5670070" cy="331759"/>
           </a:xfrm>
           <a:prstGeom prst="rect">
             <a:avLst/>
           </a:prstGeom>
         </p:spPr>
       </p:pic>
-      <p:sp>
-        <p:nvSpPr>
-          <p:cNvPr id="12" name="Title 1">
-            <a:extLst>
-              <a:ext uri="{FF2B5EF4-FFF2-40B4-BE49-F238E27FC236}">
-                <a16:creationId xmlns:a16="http://schemas.microsoft.com/office/drawing/2014/main" id="{E17763C2-A07D-40D9-BADF-0FE2A0771CD7}"/>
-              </a:ext>
-            </a:extLst>
-          </p:cNvPr>
-          <p:cNvSpPr>
-            <a:spLocks noGrp="1"/>
-          </p:cNvSpPr>
-          <p:nvPr>
-            <p:ph type="title"/>
-          </p:nvPr>
-        </p:nvSpPr>
-        <p:spPr>
-          <a:xfrm>
-            <a:off x="8976063" y="2954869"/>
-            <a:ext cx="3343923" cy="948261"/>
-          </a:xfrm>
-        </p:spPr>
-        <p:txBody>
-          <a:bodyPr>
-            <a:normAutofit/>
-          </a:bodyPr>
-          <a:lstStyle/>
-          <a:p>
-            <a:pPr algn="ctr"/>
-            <a:r>
-              <a:rPr lang="fr-FR" b="1"/>
-              <a:t>Portes I/O</a:t>
-            </a:r>
-            <a:endParaRPr lang="en-US" b="1"/>
-          </a:p>
-        </p:txBody>
-      </p:sp>
     </p:spTree>
     <p:extLst>
       <p:ext uri="{BB962C8B-B14F-4D97-AF65-F5344CB8AC3E}">
-        <p14:creationId xmlns:p14="http://schemas.microsoft.com/office/powerpoint/2010/main" val="337251404"/>
+        <p14:creationId xmlns:p14="http://schemas.microsoft.com/office/powerpoint/2010/main" val="2773437641"/>
       </p:ext>
     </p:extLst>
   </p:cSld>
@@ -4504,7 +4938,7 @@
         </p:nvSpPr>
         <p:spPr>
           <a:xfrm>
-            <a:off x="-2371078" y="6492875"/>
+            <a:off x="9276425" y="6429219"/>
             <a:ext cx="2743200" cy="365125"/>
           </a:xfrm>
         </p:spPr>
@@ -4522,10 +4956,10 @@
       </p:sp>
       <p:pic>
         <p:nvPicPr>
-          <p:cNvPr id="5" name="Picture 4">
-            <a:extLst>
-              <a:ext uri="{FF2B5EF4-FFF2-40B4-BE49-F238E27FC236}">
-                <a16:creationId xmlns:a16="http://schemas.microsoft.com/office/drawing/2014/main" id="{1B13E780-A548-4559-9784-EE3B423C422E}"/>
+          <p:cNvPr id="11" name="Picture 10">
+            <a:extLst>
+              <a:ext uri="{FF2B5EF4-FFF2-40B4-BE49-F238E27FC236}">
+                <a16:creationId xmlns:a16="http://schemas.microsoft.com/office/drawing/2014/main" id="{76AAEB43-BC63-44C6-8F05-7B23BB7647B5}"/>
               </a:ext>
             </a:extLst>
           </p:cNvPr>
@@ -4542,8 +4976,8 @@
         </p:blipFill>
         <p:spPr>
           <a:xfrm>
-            <a:off x="5249663" y="0"/>
-            <a:ext cx="6942337" cy="6877354"/>
+            <a:off x="0" y="0"/>
+            <a:ext cx="9212783" cy="6858000"/>
           </a:xfrm>
           <a:prstGeom prst="rect">
             <a:avLst/>
@@ -4552,10 +4986,10 @@
       </p:pic>
       <p:sp>
         <p:nvSpPr>
-          <p:cNvPr id="8" name="Title 1">
-            <a:extLst>
-              <a:ext uri="{FF2B5EF4-FFF2-40B4-BE49-F238E27FC236}">
-                <a16:creationId xmlns:a16="http://schemas.microsoft.com/office/drawing/2014/main" id="{02436C8C-2F0D-4DF1-BC58-9168339C8F22}"/>
+          <p:cNvPr id="12" name="Title 1">
+            <a:extLst>
+              <a:ext uri="{FF2B5EF4-FFF2-40B4-BE49-F238E27FC236}">
+                <a16:creationId xmlns:a16="http://schemas.microsoft.com/office/drawing/2014/main" id="{E17763C2-A07D-40D9-BADF-0FE2A0771CD7}"/>
               </a:ext>
             </a:extLst>
           </p:cNvPr>
@@ -4568,8 +5002,8 @@
         </p:nvSpPr>
         <p:spPr>
           <a:xfrm>
-            <a:off x="614383" y="2964546"/>
-            <a:ext cx="4140497" cy="948261"/>
+            <a:off x="8976063" y="2954869"/>
+            <a:ext cx="3343923" cy="948261"/>
           </a:xfrm>
         </p:spPr>
         <p:txBody>
@@ -4581,7 +5015,7 @@
             <a:pPr algn="ctr"/>
             <a:r>
               <a:rPr lang="fr-FR" b="1"/>
-              <a:t>Portes logiques</a:t>
+              <a:t>Portes I/O</a:t>
             </a:r>
             <a:endParaRPr lang="en-US" b="1"/>
           </a:p>
@@ -4590,7 +5024,7 @@
     </p:spTree>
     <p:extLst>
       <p:ext uri="{BB962C8B-B14F-4D97-AF65-F5344CB8AC3E}">
-        <p14:creationId xmlns:p14="http://schemas.microsoft.com/office/powerpoint/2010/main" val="2226789193"/>
+        <p14:creationId xmlns:p14="http://schemas.microsoft.com/office/powerpoint/2010/main" val="337251404"/>
       </p:ext>
     </p:extLst>
   </p:cSld>
@@ -4669,7 +5103,7 @@
         </p:nvSpPr>
         <p:spPr>
           <a:xfrm>
-            <a:off x="9276425" y="6429219"/>
+            <a:off x="-2371078" y="6492875"/>
             <a:ext cx="2743200" cy="365125"/>
           </a:xfrm>
         </p:spPr>
@@ -4687,10 +5121,10 @@
       </p:sp>
       <p:pic>
         <p:nvPicPr>
-          <p:cNvPr id="3" name="Picture 2">
-            <a:extLst>
-              <a:ext uri="{FF2B5EF4-FFF2-40B4-BE49-F238E27FC236}">
-                <a16:creationId xmlns:a16="http://schemas.microsoft.com/office/drawing/2014/main" id="{9E879D1A-3F82-4F78-AC2E-C913B506B2EB}"/>
+          <p:cNvPr id="5" name="Picture 4">
+            <a:extLst>
+              <a:ext uri="{FF2B5EF4-FFF2-40B4-BE49-F238E27FC236}">
+                <a16:creationId xmlns:a16="http://schemas.microsoft.com/office/drawing/2014/main" id="{1B13E780-A548-4559-9784-EE3B423C422E}"/>
               </a:ext>
             </a:extLst>
           </p:cNvPr>
@@ -4707,6 +5141,171 @@
         </p:blipFill>
         <p:spPr>
           <a:xfrm>
+            <a:off x="5249663" y="0"/>
+            <a:ext cx="6942337" cy="6877354"/>
+          </a:xfrm>
+          <a:prstGeom prst="rect">
+            <a:avLst/>
+          </a:prstGeom>
+        </p:spPr>
+      </p:pic>
+      <p:sp>
+        <p:nvSpPr>
+          <p:cNvPr id="8" name="Title 1">
+            <a:extLst>
+              <a:ext uri="{FF2B5EF4-FFF2-40B4-BE49-F238E27FC236}">
+                <a16:creationId xmlns:a16="http://schemas.microsoft.com/office/drawing/2014/main" id="{02436C8C-2F0D-4DF1-BC58-9168339C8F22}"/>
+              </a:ext>
+            </a:extLst>
+          </p:cNvPr>
+          <p:cNvSpPr>
+            <a:spLocks noGrp="1"/>
+          </p:cNvSpPr>
+          <p:nvPr>
+            <p:ph type="title"/>
+          </p:nvPr>
+        </p:nvSpPr>
+        <p:spPr>
+          <a:xfrm>
+            <a:off x="614383" y="2964546"/>
+            <a:ext cx="4140497" cy="948261"/>
+          </a:xfrm>
+        </p:spPr>
+        <p:txBody>
+          <a:bodyPr>
+            <a:normAutofit/>
+          </a:bodyPr>
+          <a:lstStyle/>
+          <a:p>
+            <a:pPr algn="ctr"/>
+            <a:r>
+              <a:rPr lang="fr-FR" b="1"/>
+              <a:t>Portes logiques</a:t>
+            </a:r>
+            <a:endParaRPr lang="en-US" b="1"/>
+          </a:p>
+        </p:txBody>
+      </p:sp>
+    </p:spTree>
+    <p:extLst>
+      <p:ext uri="{BB962C8B-B14F-4D97-AF65-F5344CB8AC3E}">
+        <p14:creationId xmlns:p14="http://schemas.microsoft.com/office/powerpoint/2010/main" val="2226789193"/>
+      </p:ext>
+    </p:extLst>
+  </p:cSld>
+  <p:clrMapOvr>
+    <a:masterClrMapping/>
+  </p:clrMapOvr>
+</p:sld>
+</file>
+
+<file path=ppt/slides/slide6.xml><?xml version="1.0" encoding="utf-8"?>
+<p:sld xmlns:a="http://schemas.openxmlformats.org/drawingml/2006/main" xmlns:r="http://schemas.openxmlformats.org/officeDocument/2006/relationships" xmlns:p="http://schemas.openxmlformats.org/presentationml/2006/main">
+  <p:cSld>
+    <p:bg>
+      <p:bgPr>
+        <a:gradFill>
+          <a:gsLst>
+            <a:gs pos="0">
+              <a:schemeClr val="accent1">
+                <a:lumMod val="5000"/>
+                <a:lumOff val="95000"/>
+              </a:schemeClr>
+            </a:gs>
+            <a:gs pos="74000">
+              <a:schemeClr val="accent1">
+                <a:lumMod val="45000"/>
+                <a:lumOff val="55000"/>
+              </a:schemeClr>
+            </a:gs>
+            <a:gs pos="83000">
+              <a:schemeClr val="accent1">
+                <a:lumMod val="45000"/>
+                <a:lumOff val="55000"/>
+              </a:schemeClr>
+            </a:gs>
+            <a:gs pos="100000">
+              <a:schemeClr val="accent1">
+                <a:lumMod val="30000"/>
+                <a:lumOff val="70000"/>
+              </a:schemeClr>
+            </a:gs>
+          </a:gsLst>
+          <a:lin ang="5400000" scaled="1"/>
+        </a:gradFill>
+        <a:effectLst/>
+      </p:bgPr>
+    </p:bg>
+    <p:spTree>
+      <p:nvGrpSpPr>
+        <p:cNvPr id="1" name=""/>
+        <p:cNvGrpSpPr/>
+        <p:nvPr/>
+      </p:nvGrpSpPr>
+      <p:grpSpPr>
+        <a:xfrm>
+          <a:off x="0" y="0"/>
+          <a:ext cx="0" cy="0"/>
+          <a:chOff x="0" y="0"/>
+          <a:chExt cx="0" cy="0"/>
+        </a:xfrm>
+      </p:grpSpPr>
+      <p:sp>
+        <p:nvSpPr>
+          <p:cNvPr id="33" name="Slide Number Placeholder 32">
+            <a:extLst>
+              <a:ext uri="{FF2B5EF4-FFF2-40B4-BE49-F238E27FC236}">
+                <a16:creationId xmlns:a16="http://schemas.microsoft.com/office/drawing/2014/main" id="{308BFD95-E7E2-41CF-B448-9E9715682CD6}"/>
+              </a:ext>
+            </a:extLst>
+          </p:cNvPr>
+          <p:cNvSpPr>
+            <a:spLocks noGrp="1"/>
+          </p:cNvSpPr>
+          <p:nvPr>
+            <p:ph type="sldNum" sz="quarter" idx="12"/>
+          </p:nvPr>
+        </p:nvSpPr>
+        <p:spPr>
+          <a:xfrm>
+            <a:off x="9276425" y="6429219"/>
+            <a:ext cx="2743200" cy="365125"/>
+          </a:xfrm>
+        </p:spPr>
+        <p:txBody>
+          <a:bodyPr/>
+          <a:lstStyle/>
+          <a:p>
+            <a:fld id="{F26BA1F6-0971-4337-9C55-1D3289524A07}" type="slidenum">
+              <a:rPr lang="en-US" sz="1400" b="1" smtClean="0"/>
+              <a:t>6</a:t>
+            </a:fld>
+            <a:endParaRPr lang="en-US" sz="1400" b="1"/>
+          </a:p>
+        </p:txBody>
+      </p:sp>
+      <p:pic>
+        <p:nvPicPr>
+          <p:cNvPr id="3" name="Picture 2">
+            <a:extLst>
+              <a:ext uri="{FF2B5EF4-FFF2-40B4-BE49-F238E27FC236}">
+                <a16:creationId xmlns:a16="http://schemas.microsoft.com/office/drawing/2014/main" id="{9E879D1A-3F82-4F78-AC2E-C913B506B2EB}"/>
+              </a:ext>
+            </a:extLst>
+          </p:cNvPr>
+          <p:cNvPicPr>
+            <a:picLocks noChangeAspect="1"/>
+          </p:cNvPicPr>
+          <p:nvPr/>
+        </p:nvPicPr>
+        <p:blipFill>
+          <a:blip r:embed="rId2"/>
+          <a:stretch>
+            <a:fillRect/>
+          </a:stretch>
+        </p:blipFill>
+        <p:spPr>
+          <a:xfrm>
             <a:off x="0" y="1251370"/>
             <a:ext cx="12208649" cy="4831857"/>
           </a:xfrm>
@@ -4756,6 +5355,823 @@
     <p:extLst>
       <p:ext uri="{BB962C8B-B14F-4D97-AF65-F5344CB8AC3E}">
         <p14:creationId xmlns:p14="http://schemas.microsoft.com/office/powerpoint/2010/main" val="102663968"/>
+      </p:ext>
+    </p:extLst>
+  </p:cSld>
+  <p:clrMapOvr>
+    <a:masterClrMapping/>
+  </p:clrMapOvr>
+</p:sld>
+</file>
+
+<file path=ppt/slides/slide7.xml><?xml version="1.0" encoding="utf-8"?>
+<p:sld xmlns:a="http://schemas.openxmlformats.org/drawingml/2006/main" xmlns:r="http://schemas.openxmlformats.org/officeDocument/2006/relationships" xmlns:p="http://schemas.openxmlformats.org/presentationml/2006/main">
+  <p:cSld>
+    <p:bg>
+      <p:bgPr>
+        <a:gradFill>
+          <a:gsLst>
+            <a:gs pos="0">
+              <a:schemeClr val="accent1">
+                <a:lumMod val="5000"/>
+                <a:lumOff val="95000"/>
+              </a:schemeClr>
+            </a:gs>
+            <a:gs pos="74000">
+              <a:schemeClr val="accent1">
+                <a:lumMod val="45000"/>
+                <a:lumOff val="55000"/>
+              </a:schemeClr>
+            </a:gs>
+            <a:gs pos="83000">
+              <a:schemeClr val="accent1">
+                <a:lumMod val="45000"/>
+                <a:lumOff val="55000"/>
+              </a:schemeClr>
+            </a:gs>
+            <a:gs pos="100000">
+              <a:schemeClr val="accent1">
+                <a:lumMod val="30000"/>
+                <a:lumOff val="70000"/>
+              </a:schemeClr>
+            </a:gs>
+          </a:gsLst>
+          <a:lin ang="5400000" scaled="1"/>
+        </a:gradFill>
+        <a:effectLst/>
+      </p:bgPr>
+    </p:bg>
+    <p:spTree>
+      <p:nvGrpSpPr>
+        <p:cNvPr id="1" name=""/>
+        <p:cNvGrpSpPr/>
+        <p:nvPr/>
+      </p:nvGrpSpPr>
+      <p:grpSpPr>
+        <a:xfrm>
+          <a:off x="0" y="0"/>
+          <a:ext cx="0" cy="0"/>
+          <a:chOff x="0" y="0"/>
+          <a:chExt cx="0" cy="0"/>
+        </a:xfrm>
+      </p:grpSpPr>
+      <p:sp>
+        <p:nvSpPr>
+          <p:cNvPr id="2" name="Title 1">
+            <a:extLst>
+              <a:ext uri="{FF2B5EF4-FFF2-40B4-BE49-F238E27FC236}">
+                <a16:creationId xmlns:a16="http://schemas.microsoft.com/office/drawing/2014/main" id="{41E78312-4CD1-43E2-AEA2-E2756A13FEC2}"/>
+              </a:ext>
+            </a:extLst>
+          </p:cNvPr>
+          <p:cNvSpPr>
+            <a:spLocks noGrp="1"/>
+          </p:cNvSpPr>
+          <p:nvPr>
+            <p:ph type="title"/>
+          </p:nvPr>
+        </p:nvSpPr>
+        <p:spPr>
+          <a:xfrm>
+            <a:off x="2296357" y="352180"/>
+            <a:ext cx="7599286" cy="948261"/>
+          </a:xfrm>
+        </p:spPr>
+        <p:txBody>
+          <a:bodyPr>
+            <a:normAutofit/>
+          </a:bodyPr>
+          <a:lstStyle/>
+          <a:p>
+            <a:pPr algn="ctr"/>
+            <a:r>
+              <a:rPr lang="fr-FR" b="1"/>
+              <a:t>Parser</a:t>
+            </a:r>
+            <a:endParaRPr lang="en-US" b="1"/>
+          </a:p>
+        </p:txBody>
+      </p:sp>
+      <p:sp>
+        <p:nvSpPr>
+          <p:cNvPr id="33" name="Slide Number Placeholder 32">
+            <a:extLst>
+              <a:ext uri="{FF2B5EF4-FFF2-40B4-BE49-F238E27FC236}">
+                <a16:creationId xmlns:a16="http://schemas.microsoft.com/office/drawing/2014/main" id="{308BFD95-E7E2-41CF-B448-9E9715682CD6}"/>
+              </a:ext>
+            </a:extLst>
+          </p:cNvPr>
+          <p:cNvSpPr>
+            <a:spLocks noGrp="1"/>
+          </p:cNvSpPr>
+          <p:nvPr>
+            <p:ph type="sldNum" sz="quarter" idx="12"/>
+          </p:nvPr>
+        </p:nvSpPr>
+        <p:spPr>
+          <a:xfrm>
+            <a:off x="9276425" y="6429219"/>
+            <a:ext cx="2743200" cy="365125"/>
+          </a:xfrm>
+        </p:spPr>
+        <p:txBody>
+          <a:bodyPr/>
+          <a:lstStyle/>
+          <a:p>
+            <a:fld id="{F26BA1F6-0971-4337-9C55-1D3289524A07}" type="slidenum">
+              <a:rPr lang="en-US" sz="1400" b="1" smtClean="0"/>
+              <a:t>7</a:t>
+            </a:fld>
+            <a:endParaRPr lang="en-US" sz="1400" b="1"/>
+          </a:p>
+        </p:txBody>
+      </p:sp>
+      <p:sp>
+        <p:nvSpPr>
+          <p:cNvPr id="7" name="TextBox 6">
+            <a:extLst>
+              <a:ext uri="{FF2B5EF4-FFF2-40B4-BE49-F238E27FC236}">
+                <a16:creationId xmlns:a16="http://schemas.microsoft.com/office/drawing/2014/main" id="{A3B2F530-D25A-4EFC-A8D2-4E7934DBED4F}"/>
+              </a:ext>
+            </a:extLst>
+          </p:cNvPr>
+          <p:cNvSpPr txBox="1"/>
+          <p:nvPr/>
+        </p:nvSpPr>
+        <p:spPr>
+          <a:xfrm>
+            <a:off x="599122" y="1767423"/>
+            <a:ext cx="4660772" cy="1308692"/>
+          </a:xfrm>
+          <a:prstGeom prst="rect">
+            <a:avLst/>
+          </a:prstGeom>
+          <a:noFill/>
+        </p:spPr>
+        <p:txBody>
+          <a:bodyPr wrap="square" rtlCol="0">
+            <a:spAutoFit/>
+          </a:bodyPr>
+          <a:lstStyle/>
+          <a:p>
+            <a:pPr>
+              <a:lnSpc>
+                <a:spcPct val="150000"/>
+              </a:lnSpc>
+            </a:pPr>
+            <a:r>
+              <a:rPr lang="fr-FR" sz="2400"/>
+              <a:t>Expression textuelle :</a:t>
+            </a:r>
+          </a:p>
+          <a:p>
+            <a:pPr marL="285750" indent="-285750" rtl="0">
+              <a:lnSpc>
+                <a:spcPct val="150000"/>
+              </a:lnSpc>
+              <a:buFont typeface="Arial" panose="020B0604020202020204" pitchFamily="34" charset="0"/>
+              <a:buChar char="•"/>
+            </a:pPr>
+            <a:r>
+              <a:rPr lang="fr-FR" sz="3200">
+                <a:effectLst/>
+              </a:rPr>
+              <a:t>A = and(not(a), or(c, d))</a:t>
+            </a:r>
+          </a:p>
+        </p:txBody>
+      </p:sp>
+      <p:pic>
+        <p:nvPicPr>
+          <p:cNvPr id="5" name="Picture 4">
+            <a:extLst>
+              <a:ext uri="{FF2B5EF4-FFF2-40B4-BE49-F238E27FC236}">
+                <a16:creationId xmlns:a16="http://schemas.microsoft.com/office/drawing/2014/main" id="{99DF1992-DF2A-494E-9E6B-AA5627308B40}"/>
+              </a:ext>
+            </a:extLst>
+          </p:cNvPr>
+          <p:cNvPicPr>
+            <a:picLocks noChangeAspect="1"/>
+          </p:cNvPicPr>
+          <p:nvPr/>
+        </p:nvPicPr>
+        <p:blipFill>
+          <a:blip r:embed="rId2"/>
+          <a:stretch>
+            <a:fillRect/>
+          </a:stretch>
+        </p:blipFill>
+        <p:spPr>
+          <a:xfrm>
+            <a:off x="974348" y="3731050"/>
+            <a:ext cx="3910320" cy="1419671"/>
+          </a:xfrm>
+          <a:prstGeom prst="rect">
+            <a:avLst/>
+          </a:prstGeom>
+        </p:spPr>
+      </p:pic>
+      <p:sp>
+        <p:nvSpPr>
+          <p:cNvPr id="9" name="Rectangle 8">
+            <a:extLst>
+              <a:ext uri="{FF2B5EF4-FFF2-40B4-BE49-F238E27FC236}">
+                <a16:creationId xmlns:a16="http://schemas.microsoft.com/office/drawing/2014/main" id="{11005375-7C90-4003-8166-9DA636DD5F56}"/>
+              </a:ext>
+            </a:extLst>
+          </p:cNvPr>
+          <p:cNvSpPr/>
+          <p:nvPr/>
+        </p:nvSpPr>
+        <p:spPr>
+          <a:xfrm>
+            <a:off x="7088074" y="2421769"/>
+            <a:ext cx="1948650" cy="594804"/>
+          </a:xfrm>
+          <a:prstGeom prst="rect">
+            <a:avLst/>
+          </a:prstGeom>
+          <a:solidFill>
+            <a:schemeClr val="bg1"/>
+          </a:solidFill>
+          <a:ln>
+            <a:solidFill>
+              <a:schemeClr val="tx1"/>
+            </a:solidFill>
+          </a:ln>
+          <a:effectLst>
+            <a:outerShdw blurRad="50800" dist="38100" dir="5400000" algn="t" rotWithShape="0">
+              <a:prstClr val="black">
+                <a:alpha val="40000"/>
+              </a:prstClr>
+            </a:outerShdw>
+          </a:effectLst>
+        </p:spPr>
+        <p:style>
+          <a:lnRef idx="2">
+            <a:schemeClr val="dk1">
+              <a:shade val="50000"/>
+            </a:schemeClr>
+          </a:lnRef>
+          <a:fillRef idx="1">
+            <a:schemeClr val="dk1"/>
+          </a:fillRef>
+          <a:effectRef idx="0">
+            <a:schemeClr val="dk1"/>
+          </a:effectRef>
+          <a:fontRef idx="minor">
+            <a:schemeClr val="lt1"/>
+          </a:fontRef>
+        </p:style>
+        <p:txBody>
+          <a:bodyPr rtlCol="0" anchor="ctr"/>
+          <a:lstStyle/>
+          <a:p>
+            <a:pPr algn="ctr"/>
+            <a:r>
+              <a:rPr lang="fr-FR" sz="2400">
+                <a:solidFill>
+                  <a:schemeClr val="tx1"/>
+                </a:solidFill>
+              </a:rPr>
+              <a:t>porte</a:t>
+            </a:r>
+            <a:endParaRPr lang="en-US" sz="2400">
+              <a:solidFill>
+                <a:schemeClr val="tx1"/>
+              </a:solidFill>
+            </a:endParaRPr>
+          </a:p>
+        </p:txBody>
+      </p:sp>
+      <p:sp>
+        <p:nvSpPr>
+          <p:cNvPr id="10" name="Rectangle 9">
+            <a:extLst>
+              <a:ext uri="{FF2B5EF4-FFF2-40B4-BE49-F238E27FC236}">
+                <a16:creationId xmlns:a16="http://schemas.microsoft.com/office/drawing/2014/main" id="{16097B10-C51F-490C-9B61-B79A0DB9C3B4}"/>
+              </a:ext>
+            </a:extLst>
+          </p:cNvPr>
+          <p:cNvSpPr/>
+          <p:nvPr/>
+        </p:nvSpPr>
+        <p:spPr>
+          <a:xfrm>
+            <a:off x="5776278" y="3896381"/>
+            <a:ext cx="1948650" cy="594804"/>
+          </a:xfrm>
+          <a:prstGeom prst="rect">
+            <a:avLst/>
+          </a:prstGeom>
+          <a:solidFill>
+            <a:schemeClr val="bg1"/>
+          </a:solidFill>
+          <a:ln>
+            <a:solidFill>
+              <a:schemeClr val="tx1"/>
+            </a:solidFill>
+          </a:ln>
+          <a:effectLst>
+            <a:outerShdw blurRad="50800" dist="38100" dir="5400000" algn="t" rotWithShape="0">
+              <a:prstClr val="black">
+                <a:alpha val="40000"/>
+              </a:prstClr>
+            </a:outerShdw>
+          </a:effectLst>
+        </p:spPr>
+        <p:style>
+          <a:lnRef idx="2">
+            <a:schemeClr val="dk1">
+              <a:shade val="50000"/>
+            </a:schemeClr>
+          </a:lnRef>
+          <a:fillRef idx="1">
+            <a:schemeClr val="dk1"/>
+          </a:fillRef>
+          <a:effectRef idx="0">
+            <a:schemeClr val="dk1"/>
+          </a:effectRef>
+          <a:fontRef idx="minor">
+            <a:schemeClr val="lt1"/>
+          </a:fontRef>
+        </p:style>
+        <p:txBody>
+          <a:bodyPr rtlCol="0" anchor="ctr"/>
+          <a:lstStyle/>
+          <a:p>
+            <a:pPr algn="ctr"/>
+            <a:r>
+              <a:rPr lang="fr-FR" sz="2400">
+                <a:solidFill>
+                  <a:schemeClr val="tx1"/>
+                </a:solidFill>
+              </a:rPr>
+              <a:t>entrée</a:t>
+            </a:r>
+            <a:endParaRPr lang="en-US" sz="2400">
+              <a:solidFill>
+                <a:schemeClr val="tx1"/>
+              </a:solidFill>
+            </a:endParaRPr>
+          </a:p>
+        </p:txBody>
+      </p:sp>
+      <p:sp>
+        <p:nvSpPr>
+          <p:cNvPr id="11" name="Rectangle 10">
+            <a:extLst>
+              <a:ext uri="{FF2B5EF4-FFF2-40B4-BE49-F238E27FC236}">
+                <a16:creationId xmlns:a16="http://schemas.microsoft.com/office/drawing/2014/main" id="{9295D38F-DA34-455B-B17C-907FAF6BC7F8}"/>
+              </a:ext>
+            </a:extLst>
+          </p:cNvPr>
+          <p:cNvSpPr/>
+          <p:nvPr/>
+        </p:nvSpPr>
+        <p:spPr>
+          <a:xfrm>
+            <a:off x="8578783" y="3896381"/>
+            <a:ext cx="1948650" cy="594804"/>
+          </a:xfrm>
+          <a:prstGeom prst="rect">
+            <a:avLst/>
+          </a:prstGeom>
+          <a:solidFill>
+            <a:schemeClr val="bg1"/>
+          </a:solidFill>
+          <a:ln>
+            <a:solidFill>
+              <a:schemeClr val="tx1"/>
+            </a:solidFill>
+          </a:ln>
+          <a:effectLst>
+            <a:outerShdw blurRad="50800" dist="38100" dir="5400000" algn="t" rotWithShape="0">
+              <a:prstClr val="black">
+                <a:alpha val="40000"/>
+              </a:prstClr>
+            </a:outerShdw>
+          </a:effectLst>
+        </p:spPr>
+        <p:style>
+          <a:lnRef idx="2">
+            <a:schemeClr val="dk1">
+              <a:shade val="50000"/>
+            </a:schemeClr>
+          </a:lnRef>
+          <a:fillRef idx="1">
+            <a:schemeClr val="dk1"/>
+          </a:fillRef>
+          <a:effectRef idx="0">
+            <a:schemeClr val="dk1"/>
+          </a:effectRef>
+          <a:fontRef idx="minor">
+            <a:schemeClr val="lt1"/>
+          </a:fontRef>
+        </p:style>
+        <p:txBody>
+          <a:bodyPr rtlCol="0" anchor="ctr"/>
+          <a:lstStyle/>
+          <a:p>
+            <a:pPr algn="ctr"/>
+            <a:r>
+              <a:rPr lang="fr-FR" sz="2400">
+                <a:solidFill>
+                  <a:schemeClr val="tx1"/>
+                </a:solidFill>
+              </a:rPr>
+              <a:t>logique</a:t>
+            </a:r>
+            <a:endParaRPr lang="en-US" sz="2400">
+              <a:solidFill>
+                <a:schemeClr val="tx1"/>
+              </a:solidFill>
+            </a:endParaRPr>
+          </a:p>
+        </p:txBody>
+      </p:sp>
+      <p:sp>
+        <p:nvSpPr>
+          <p:cNvPr id="12" name="Rectangle 11">
+            <a:extLst>
+              <a:ext uri="{FF2B5EF4-FFF2-40B4-BE49-F238E27FC236}">
+                <a16:creationId xmlns:a16="http://schemas.microsoft.com/office/drawing/2014/main" id="{46C68441-14B6-4352-A214-31DCB9EEBF60}"/>
+              </a:ext>
+            </a:extLst>
+          </p:cNvPr>
+          <p:cNvSpPr/>
+          <p:nvPr/>
+        </p:nvSpPr>
+        <p:spPr>
+          <a:xfrm>
+            <a:off x="7360944" y="5582810"/>
+            <a:ext cx="1948650" cy="594804"/>
+          </a:xfrm>
+          <a:prstGeom prst="rect">
+            <a:avLst/>
+          </a:prstGeom>
+          <a:solidFill>
+            <a:schemeClr val="bg1"/>
+          </a:solidFill>
+          <a:ln>
+            <a:solidFill>
+              <a:schemeClr val="tx1"/>
+            </a:solidFill>
+          </a:ln>
+          <a:effectLst>
+            <a:outerShdw blurRad="50800" dist="38100" dir="5400000" algn="t" rotWithShape="0">
+              <a:prstClr val="black">
+                <a:alpha val="40000"/>
+              </a:prstClr>
+            </a:outerShdw>
+          </a:effectLst>
+        </p:spPr>
+        <p:style>
+          <a:lnRef idx="2">
+            <a:schemeClr val="dk1">
+              <a:shade val="50000"/>
+            </a:schemeClr>
+          </a:lnRef>
+          <a:fillRef idx="1">
+            <a:schemeClr val="dk1"/>
+          </a:fillRef>
+          <a:effectRef idx="0">
+            <a:schemeClr val="dk1"/>
+          </a:effectRef>
+          <a:fontRef idx="minor">
+            <a:schemeClr val="lt1"/>
+          </a:fontRef>
+        </p:style>
+        <p:txBody>
+          <a:bodyPr rtlCol="0" anchor="ctr"/>
+          <a:lstStyle/>
+          <a:p>
+            <a:pPr algn="ctr"/>
+            <a:r>
+              <a:rPr lang="fr-FR" sz="2400">
+                <a:solidFill>
+                  <a:schemeClr val="tx1"/>
+                </a:solidFill>
+              </a:rPr>
+              <a:t>1 paramètre</a:t>
+            </a:r>
+            <a:endParaRPr lang="en-US" sz="2400">
+              <a:solidFill>
+                <a:schemeClr val="tx1"/>
+              </a:solidFill>
+            </a:endParaRPr>
+          </a:p>
+        </p:txBody>
+      </p:sp>
+      <p:sp>
+        <p:nvSpPr>
+          <p:cNvPr id="13" name="Rectangle 12">
+            <a:extLst>
+              <a:ext uri="{FF2B5EF4-FFF2-40B4-BE49-F238E27FC236}">
+                <a16:creationId xmlns:a16="http://schemas.microsoft.com/office/drawing/2014/main" id="{6D370928-8BE6-4D68-ADBD-F103C131E5FE}"/>
+              </a:ext>
+            </a:extLst>
+          </p:cNvPr>
+          <p:cNvSpPr/>
+          <p:nvPr/>
+        </p:nvSpPr>
+        <p:spPr>
+          <a:xfrm>
+            <a:off x="9893418" y="5582810"/>
+            <a:ext cx="1948650" cy="594804"/>
+          </a:xfrm>
+          <a:prstGeom prst="rect">
+            <a:avLst/>
+          </a:prstGeom>
+          <a:solidFill>
+            <a:schemeClr val="bg1"/>
+          </a:solidFill>
+          <a:ln>
+            <a:solidFill>
+              <a:schemeClr val="tx1"/>
+            </a:solidFill>
+          </a:ln>
+          <a:effectLst>
+            <a:outerShdw blurRad="50800" dist="38100" dir="5400000" algn="t" rotWithShape="0">
+              <a:prstClr val="black">
+                <a:alpha val="40000"/>
+              </a:prstClr>
+            </a:outerShdw>
+          </a:effectLst>
+        </p:spPr>
+        <p:style>
+          <a:lnRef idx="2">
+            <a:schemeClr val="dk1">
+              <a:shade val="50000"/>
+            </a:schemeClr>
+          </a:lnRef>
+          <a:fillRef idx="1">
+            <a:schemeClr val="dk1"/>
+          </a:fillRef>
+          <a:effectRef idx="0">
+            <a:schemeClr val="dk1"/>
+          </a:effectRef>
+          <a:fontRef idx="minor">
+            <a:schemeClr val="lt1"/>
+          </a:fontRef>
+        </p:style>
+        <p:txBody>
+          <a:bodyPr rtlCol="0" anchor="ctr"/>
+          <a:lstStyle/>
+          <a:p>
+            <a:pPr algn="ctr"/>
+            <a:r>
+              <a:rPr lang="fr-FR" sz="2400">
+                <a:solidFill>
+                  <a:schemeClr val="tx1"/>
+                </a:solidFill>
+              </a:rPr>
+              <a:t>2 paramètres</a:t>
+            </a:r>
+            <a:endParaRPr lang="en-US" sz="2400">
+              <a:solidFill>
+                <a:schemeClr val="tx1"/>
+              </a:solidFill>
+            </a:endParaRPr>
+          </a:p>
+        </p:txBody>
+      </p:sp>
+      <p:cxnSp>
+        <p:nvCxnSpPr>
+          <p:cNvPr id="14" name="Straight Arrow Connector 13">
+            <a:extLst>
+              <a:ext uri="{FF2B5EF4-FFF2-40B4-BE49-F238E27FC236}">
+                <a16:creationId xmlns:a16="http://schemas.microsoft.com/office/drawing/2014/main" id="{89297AD1-F3AC-4D40-83D9-CD1CEFD1FB02}"/>
+              </a:ext>
+            </a:extLst>
+          </p:cNvPr>
+          <p:cNvCxnSpPr>
+            <a:cxnSpLocks/>
+            <a:stCxn id="9" idx="2"/>
+            <a:endCxn id="11" idx="0"/>
+          </p:cNvCxnSpPr>
+          <p:nvPr/>
+        </p:nvCxnSpPr>
+        <p:spPr>
+          <a:xfrm>
+            <a:off x="8062399" y="3016573"/>
+            <a:ext cx="1490709" cy="879808"/>
+          </a:xfrm>
+          <a:prstGeom prst="straightConnector1">
+            <a:avLst/>
+          </a:prstGeom>
+          <a:ln w="19050">
+            <a:solidFill>
+              <a:schemeClr val="tx1"/>
+            </a:solidFill>
+            <a:tailEnd type="triangle"/>
+          </a:ln>
+        </p:spPr>
+        <p:style>
+          <a:lnRef idx="1">
+            <a:schemeClr val="accent1"/>
+          </a:lnRef>
+          <a:fillRef idx="0">
+            <a:schemeClr val="accent1"/>
+          </a:fillRef>
+          <a:effectRef idx="0">
+            <a:schemeClr val="accent1"/>
+          </a:effectRef>
+          <a:fontRef idx="minor">
+            <a:schemeClr val="tx1"/>
+          </a:fontRef>
+        </p:style>
+      </p:cxnSp>
+      <p:cxnSp>
+        <p:nvCxnSpPr>
+          <p:cNvPr id="18" name="Straight Arrow Connector 17">
+            <a:extLst>
+              <a:ext uri="{FF2B5EF4-FFF2-40B4-BE49-F238E27FC236}">
+                <a16:creationId xmlns:a16="http://schemas.microsoft.com/office/drawing/2014/main" id="{7B4478C8-795B-4305-9383-C354F212F592}"/>
+              </a:ext>
+            </a:extLst>
+          </p:cNvPr>
+          <p:cNvCxnSpPr>
+            <a:cxnSpLocks/>
+            <a:stCxn id="9" idx="2"/>
+            <a:endCxn id="10" idx="0"/>
+          </p:cNvCxnSpPr>
+          <p:nvPr/>
+        </p:nvCxnSpPr>
+        <p:spPr>
+          <a:xfrm flipH="1">
+            <a:off x="6750603" y="3016573"/>
+            <a:ext cx="1311796" cy="879808"/>
+          </a:xfrm>
+          <a:prstGeom prst="straightConnector1">
+            <a:avLst/>
+          </a:prstGeom>
+          <a:ln w="19050">
+            <a:solidFill>
+              <a:schemeClr val="tx1"/>
+            </a:solidFill>
+            <a:tailEnd type="triangle"/>
+          </a:ln>
+        </p:spPr>
+        <p:style>
+          <a:lnRef idx="1">
+            <a:schemeClr val="accent1"/>
+          </a:lnRef>
+          <a:fillRef idx="0">
+            <a:schemeClr val="accent1"/>
+          </a:fillRef>
+          <a:effectRef idx="0">
+            <a:schemeClr val="accent1"/>
+          </a:effectRef>
+          <a:fontRef idx="minor">
+            <a:schemeClr val="tx1"/>
+          </a:fontRef>
+        </p:style>
+      </p:cxnSp>
+      <p:cxnSp>
+        <p:nvCxnSpPr>
+          <p:cNvPr id="21" name="Straight Arrow Connector 20">
+            <a:extLst>
+              <a:ext uri="{FF2B5EF4-FFF2-40B4-BE49-F238E27FC236}">
+                <a16:creationId xmlns:a16="http://schemas.microsoft.com/office/drawing/2014/main" id="{DC9C780D-5D42-4B45-BC47-C197FC9BA79A}"/>
+              </a:ext>
+            </a:extLst>
+          </p:cNvPr>
+          <p:cNvCxnSpPr>
+            <a:cxnSpLocks/>
+            <a:stCxn id="11" idx="2"/>
+            <a:endCxn id="12" idx="0"/>
+          </p:cNvCxnSpPr>
+          <p:nvPr/>
+        </p:nvCxnSpPr>
+        <p:spPr>
+          <a:xfrm flipH="1">
+            <a:off x="8335269" y="4491185"/>
+            <a:ext cx="1217839" cy="1091625"/>
+          </a:xfrm>
+          <a:prstGeom prst="straightConnector1">
+            <a:avLst/>
+          </a:prstGeom>
+          <a:ln w="19050">
+            <a:solidFill>
+              <a:schemeClr val="tx1"/>
+            </a:solidFill>
+            <a:tailEnd type="triangle"/>
+          </a:ln>
+        </p:spPr>
+        <p:style>
+          <a:lnRef idx="1">
+            <a:schemeClr val="accent1"/>
+          </a:lnRef>
+          <a:fillRef idx="0">
+            <a:schemeClr val="accent1"/>
+          </a:fillRef>
+          <a:effectRef idx="0">
+            <a:schemeClr val="accent1"/>
+          </a:effectRef>
+          <a:fontRef idx="minor">
+            <a:schemeClr val="tx1"/>
+          </a:fontRef>
+        </p:style>
+      </p:cxnSp>
+      <p:cxnSp>
+        <p:nvCxnSpPr>
+          <p:cNvPr id="24" name="Straight Arrow Connector 23">
+            <a:extLst>
+              <a:ext uri="{FF2B5EF4-FFF2-40B4-BE49-F238E27FC236}">
+                <a16:creationId xmlns:a16="http://schemas.microsoft.com/office/drawing/2014/main" id="{C626BF1B-917C-46FD-8A3B-E222F5FCA597}"/>
+              </a:ext>
+            </a:extLst>
+          </p:cNvPr>
+          <p:cNvCxnSpPr>
+            <a:cxnSpLocks/>
+            <a:stCxn id="11" idx="2"/>
+            <a:endCxn id="13" idx="0"/>
+          </p:cNvCxnSpPr>
+          <p:nvPr/>
+        </p:nvCxnSpPr>
+        <p:spPr>
+          <a:xfrm>
+            <a:off x="9553108" y="4491185"/>
+            <a:ext cx="1314635" cy="1091625"/>
+          </a:xfrm>
+          <a:prstGeom prst="straightConnector1">
+            <a:avLst/>
+          </a:prstGeom>
+          <a:ln w="19050">
+            <a:solidFill>
+              <a:schemeClr val="tx1"/>
+            </a:solidFill>
+            <a:tailEnd type="triangle"/>
+          </a:ln>
+        </p:spPr>
+        <p:style>
+          <a:lnRef idx="1">
+            <a:schemeClr val="accent1"/>
+          </a:lnRef>
+          <a:fillRef idx="0">
+            <a:schemeClr val="accent1"/>
+          </a:fillRef>
+          <a:effectRef idx="0">
+            <a:schemeClr val="accent1"/>
+          </a:effectRef>
+          <a:fontRef idx="minor">
+            <a:schemeClr val="tx1"/>
+          </a:fontRef>
+        </p:style>
+      </p:cxnSp>
+      <p:sp>
+        <p:nvSpPr>
+          <p:cNvPr id="32" name="TextBox 31">
+            <a:extLst>
+              <a:ext uri="{FF2B5EF4-FFF2-40B4-BE49-F238E27FC236}">
+                <a16:creationId xmlns:a16="http://schemas.microsoft.com/office/drawing/2014/main" id="{28836114-6CD1-4E52-954D-D7295DF5D6D9}"/>
+              </a:ext>
+            </a:extLst>
+          </p:cNvPr>
+          <p:cNvSpPr txBox="1"/>
+          <p:nvPr/>
+        </p:nvSpPr>
+        <p:spPr>
+          <a:xfrm>
+            <a:off x="6206971" y="1767423"/>
+            <a:ext cx="4660772" cy="589072"/>
+          </a:xfrm>
+          <a:prstGeom prst="rect">
+            <a:avLst/>
+          </a:prstGeom>
+          <a:noFill/>
+        </p:spPr>
+        <p:txBody>
+          <a:bodyPr wrap="square" rtlCol="0">
+            <a:spAutoFit/>
+          </a:bodyPr>
+          <a:lstStyle/>
+          <a:p>
+            <a:pPr>
+              <a:lnSpc>
+                <a:spcPct val="150000"/>
+              </a:lnSpc>
+            </a:pPr>
+            <a:r>
+              <a:rPr lang="fr-FR" sz="2400">
+                <a:effectLst/>
+              </a:rPr>
+              <a:t>Méthode </a:t>
+            </a:r>
+            <a:r>
+              <a:rPr lang="fr-FR" sz="2400" i="1">
+                <a:effectLst/>
+              </a:rPr>
+              <a:t>checkGateExpression</a:t>
+            </a:r>
+          </a:p>
+        </p:txBody>
+      </p:sp>
+    </p:spTree>
+    <p:extLst>
+      <p:ext uri="{BB962C8B-B14F-4D97-AF65-F5344CB8AC3E}">
+        <p14:creationId xmlns:p14="http://schemas.microsoft.com/office/powerpoint/2010/main" val="914713404"/>
       </p:ext>
     </p:extLst>
   </p:cSld>

</xml_diff>